<commit_message>
Added analysis of continuous variables using binning
Signed-off-by: Karthik Gadepalli <karthik.gadepalli@gmail.com>
</commit_message>
<xml_diff>
--- a/Radhika_Karthik_LendingClubCaseStudyAnalysis.pptx
+++ b/Radhika_Karthik_LendingClubCaseStudyAnalysis.pptx
@@ -5,11 +5,16 @@
     <p:sldMasterId id="2147483648" r:id="rId1"/>
   </p:sldMasterIdLst>
   <p:sldIdLst>
-    <p:sldId id="261" r:id="rId2"/>
-    <p:sldId id="256" r:id="rId3"/>
-    <p:sldId id="262" r:id="rId4"/>
-    <p:sldId id="263" r:id="rId5"/>
-    <p:sldId id="264" r:id="rId6"/>
+    <p:sldId id="265" r:id="rId2"/>
+    <p:sldId id="269" r:id="rId3"/>
+    <p:sldId id="266" r:id="rId4"/>
+    <p:sldId id="267" r:id="rId5"/>
+    <p:sldId id="268" r:id="rId6"/>
+    <p:sldId id="261" r:id="rId7"/>
+    <p:sldId id="256" r:id="rId8"/>
+    <p:sldId id="262" r:id="rId9"/>
+    <p:sldId id="263" r:id="rId10"/>
+    <p:sldId id="264" r:id="rId11"/>
   </p:sldIdLst>
   <p:sldSz cx="12192000" cy="6858000"/>
   <p:notesSz cx="6858000" cy="9144000"/>
@@ -108,6 +113,11 @@
       </a:defRPr>
     </a:lvl9pPr>
   </p:defaultTextStyle>
+  <p:extLst>
+    <p:ext uri="{EFAFB233-063F-42B5-8137-9DF3F51BA10A}">
+      <p15:sldGuideLst xmlns:p15="http://schemas.microsoft.com/office/powerpoint/2012/main"/>
+    </p:ext>
+  </p:extLst>
 </p:presentation>
 </file>
 
@@ -3327,44 +3337,413 @@
       </p:grpSpPr>
       <p:sp>
         <p:nvSpPr>
-          <p:cNvPr id="2" name="Title 1">
-            <a:extLst>
-              <a:ext uri="{FF2B5EF4-FFF2-40B4-BE49-F238E27FC236}">
-                <a16:creationId xmlns:a16="http://schemas.microsoft.com/office/drawing/2014/main" id="{192B6BBD-345C-6950-E387-AABFA86580F2}"/>
-              </a:ext>
-            </a:extLst>
-          </p:cNvPr>
-          <p:cNvSpPr>
-            <a:spLocks noGrp="1"/>
-          </p:cNvSpPr>
-          <p:nvPr>
-            <p:ph type="title"/>
-          </p:nvPr>
+          <p:cNvPr id="8" name="TextBox 7">
+            <a:extLst>
+              <a:ext uri="{FF2B5EF4-FFF2-40B4-BE49-F238E27FC236}">
+                <a16:creationId xmlns:a16="http://schemas.microsoft.com/office/drawing/2014/main" id="{48249AEC-557F-5219-A9FE-C61D6E16E4F1}"/>
+              </a:ext>
+            </a:extLst>
+          </p:cNvPr>
+          <p:cNvSpPr txBox="1"/>
+          <p:nvPr/>
         </p:nvSpPr>
         <p:spPr>
           <a:xfrm>
-            <a:off x="838200" y="2766218"/>
-            <a:ext cx="10515600" cy="1325563"/>
+            <a:off x="528534" y="5335873"/>
+            <a:ext cx="11739666" cy="1200329"/>
           </a:xfrm>
+          <a:prstGeom prst="rect">
+            <a:avLst/>
+          </a:prstGeom>
+          <a:noFill/>
         </p:spPr>
         <p:txBody>
-          <a:bodyPr>
+          <a:bodyPr wrap="square" rtlCol="0">
+            <a:spAutoFit/>
+          </a:bodyPr>
+          <a:lstStyle/>
+          <a:p>
+            <a:pPr algn="l"/>
+            <a:r>
+              <a:rPr lang="en-US" b="1" i="0" dirty="0">
+                <a:effectLst/>
+                <a:latin typeface="system-ui"/>
+              </a:rPr>
+              <a:t>Conclusions drawn</a:t>
+            </a:r>
+          </a:p>
+          <a:p>
+            <a:pPr marL="342900" indent="-342900" algn="l">
+              <a:buAutoNum type="arabicPeriod"/>
+            </a:pPr>
+            <a:r>
+              <a:rPr lang="en-US" b="0" i="0" dirty="0">
+                <a:effectLst/>
+                <a:latin typeface="system-ui"/>
+              </a:rPr>
+              <a:t>More loans were disbursed under 9%-13% interest rate bracket.</a:t>
+            </a:r>
+          </a:p>
+          <a:p>
+            <a:pPr marL="342900" indent="-342900" algn="l">
+              <a:buAutoNum type="arabicPeriod"/>
+            </a:pPr>
+            <a:r>
+              <a:rPr lang="en-US" b="0" i="0" dirty="0">
+                <a:effectLst/>
+                <a:latin typeface="system-ui"/>
+              </a:rPr>
+              <a:t>More loans were defaulted under 13%-17% interest rate bracket.</a:t>
+            </a:r>
+          </a:p>
+          <a:p>
+            <a:pPr marL="342900" indent="-342900" algn="l">
+              <a:buAutoNum type="arabicPeriod"/>
+            </a:pPr>
+            <a:r>
+              <a:rPr lang="en-US" b="0" i="0" dirty="0">
+                <a:effectLst/>
+                <a:latin typeface="system-ui"/>
+              </a:rPr>
+              <a:t>We can clearly see the trend that charged-off loan percentage is increasing as the rate of interest is increasing.</a:t>
+            </a:r>
+          </a:p>
+        </p:txBody>
+      </p:sp>
+      <p:sp>
+        <p:nvSpPr>
+          <p:cNvPr id="9" name="Title 1">
+            <a:extLst>
+              <a:ext uri="{FF2B5EF4-FFF2-40B4-BE49-F238E27FC236}">
+                <a16:creationId xmlns:a16="http://schemas.microsoft.com/office/drawing/2014/main" id="{B12C4308-289C-71A2-56CE-A4F57BE2E636}"/>
+              </a:ext>
+            </a:extLst>
+          </p:cNvPr>
+          <p:cNvSpPr txBox="1">
+            <a:spLocks/>
+          </p:cNvSpPr>
+          <p:nvPr/>
+        </p:nvSpPr>
+        <p:spPr>
+          <a:xfrm>
+            <a:off x="222470" y="-168275"/>
+            <a:ext cx="11415596" cy="1325563"/>
+          </a:xfrm>
+          <a:prstGeom prst="rect">
+            <a:avLst/>
+          </a:prstGeom>
+        </p:spPr>
+        <p:txBody>
+          <a:bodyPr vert="horz" lIns="91440" tIns="45720" rIns="91440" bIns="45720" rtlCol="0" anchor="b">
             <a:normAutofit/>
           </a:bodyPr>
-          <a:lstStyle/>
-          <a:p>
-            <a:pPr algn="ctr"/>
-            <a:r>
-              <a:rPr lang="en-US" sz="4800" b="1" dirty="0"/>
-              <a:t>Bivariate Analysis using Heatmaps</a:t>
-            </a:r>
-          </a:p>
-        </p:txBody>
-      </p:sp>
+          <a:lstStyle>
+            <a:lvl1pPr algn="ctr" defTabSz="914400" rtl="0" eaLnBrk="1" latinLnBrk="0" hangingPunct="1">
+              <a:lnSpc>
+                <a:spcPct val="90000"/>
+              </a:lnSpc>
+              <a:spcBef>
+                <a:spcPct val="0"/>
+              </a:spcBef>
+              <a:buNone/>
+              <a:defRPr sz="6000" kern="1200">
+                <a:solidFill>
+                  <a:schemeClr val="tx1"/>
+                </a:solidFill>
+                <a:latin typeface="+mj-lt"/>
+                <a:ea typeface="+mj-ea"/>
+                <a:cs typeface="+mj-cs"/>
+              </a:defRPr>
+            </a:lvl1pPr>
+          </a:lstStyle>
+          <a:p>
+            <a:r>
+              <a:rPr lang="en-US" sz="4000" b="1" dirty="0"/>
+              <a:t>Analysis of Interest rate groups</a:t>
+            </a:r>
+          </a:p>
+        </p:txBody>
+      </p:sp>
+      <p:pic>
+        <p:nvPicPr>
+          <p:cNvPr id="3" name="Picture 2">
+            <a:extLst>
+              <a:ext uri="{FF2B5EF4-FFF2-40B4-BE49-F238E27FC236}">
+                <a16:creationId xmlns:a16="http://schemas.microsoft.com/office/drawing/2014/main" id="{990F677E-7E54-FA3F-298E-E72D40CEC766}"/>
+              </a:ext>
+            </a:extLst>
+          </p:cNvPr>
+          <p:cNvPicPr>
+            <a:picLocks noChangeAspect="1"/>
+          </p:cNvPicPr>
+          <p:nvPr/>
+        </p:nvPicPr>
+        <p:blipFill>
+          <a:blip r:embed="rId2"/>
+          <a:stretch>
+            <a:fillRect/>
+          </a:stretch>
+        </p:blipFill>
+        <p:spPr>
+          <a:xfrm>
+            <a:off x="0" y="1417940"/>
+            <a:ext cx="12192000" cy="3514120"/>
+          </a:xfrm>
+          <a:prstGeom prst="rect">
+            <a:avLst/>
+          </a:prstGeom>
+        </p:spPr>
+      </p:pic>
     </p:spTree>
     <p:extLst>
       <p:ext uri="{BB962C8B-B14F-4D97-AF65-F5344CB8AC3E}">
-        <p14:creationId xmlns:p14="http://schemas.microsoft.com/office/powerpoint/2010/main" val="2285812875"/>
+        <p14:creationId xmlns:p14="http://schemas.microsoft.com/office/powerpoint/2010/main" val="3583510684"/>
+      </p:ext>
+    </p:extLst>
+  </p:cSld>
+  <p:clrMapOvr>
+    <a:masterClrMapping/>
+  </p:clrMapOvr>
+</p:sld>
+</file>
+
+<file path=ppt/slides/slide10.xml><?xml version="1.0" encoding="utf-8"?>
+<p:sld xmlns:a="http://schemas.openxmlformats.org/drawingml/2006/main" xmlns:r="http://schemas.openxmlformats.org/officeDocument/2006/relationships" xmlns:p="http://schemas.openxmlformats.org/presentationml/2006/main">
+  <p:cSld>
+    <p:spTree>
+      <p:nvGrpSpPr>
+        <p:cNvPr id="1" name=""/>
+        <p:cNvGrpSpPr/>
+        <p:nvPr/>
+      </p:nvGrpSpPr>
+      <p:grpSpPr>
+        <a:xfrm>
+          <a:off x="0" y="0"/>
+          <a:ext cx="0" cy="0"/>
+          <a:chOff x="0" y="0"/>
+          <a:chExt cx="0" cy="0"/>
+        </a:xfrm>
+      </p:grpSpPr>
+      <p:sp>
+        <p:nvSpPr>
+          <p:cNvPr id="8" name="TextBox 7">
+            <a:extLst>
+              <a:ext uri="{FF2B5EF4-FFF2-40B4-BE49-F238E27FC236}">
+                <a16:creationId xmlns:a16="http://schemas.microsoft.com/office/drawing/2014/main" id="{48249AEC-557F-5219-A9FE-C61D6E16E4F1}"/>
+              </a:ext>
+            </a:extLst>
+          </p:cNvPr>
+          <p:cNvSpPr txBox="1"/>
+          <p:nvPr/>
+        </p:nvSpPr>
+        <p:spPr>
+          <a:xfrm>
+            <a:off x="452334" y="5325533"/>
+            <a:ext cx="11739666" cy="1754326"/>
+          </a:xfrm>
+          <a:prstGeom prst="rect">
+            <a:avLst/>
+          </a:prstGeom>
+          <a:noFill/>
+        </p:spPr>
+        <p:txBody>
+          <a:bodyPr wrap="square" rtlCol="0">
+            <a:spAutoFit/>
+          </a:bodyPr>
+          <a:lstStyle/>
+          <a:p>
+            <a:pPr algn="l"/>
+            <a:r>
+              <a:rPr lang="en-US" b="1" i="0" dirty="0">
+                <a:effectLst/>
+                <a:latin typeface="system-ui"/>
+              </a:rPr>
+              <a:t>Conclusions drawn</a:t>
+            </a:r>
+            <a:endParaRPr lang="en-US" b="0" i="0" dirty="0">
+              <a:effectLst/>
+              <a:latin typeface="system-ui"/>
+            </a:endParaRPr>
+          </a:p>
+          <a:p>
+            <a:pPr marL="342900" indent="-342900">
+              <a:buAutoNum type="arabicPeriod"/>
+            </a:pPr>
+            <a:r>
+              <a:rPr lang="en-US" b="0" i="0" dirty="0">
+                <a:effectLst/>
+                <a:latin typeface="system-ui"/>
+              </a:rPr>
+              <a:t>More than 50% of borrowers with Annual income between 58k and 85k and Active credit lines between 36 &amp; 44 </a:t>
+            </a:r>
+            <a:r>
+              <a:rPr lang="en-US" b="1" i="0" dirty="0">
+                <a:effectLst/>
+                <a:latin typeface="system-ui"/>
+              </a:rPr>
+              <a:t>defaulted</a:t>
+            </a:r>
+            <a:r>
+              <a:rPr lang="en-US" b="0" i="0" dirty="0">
+                <a:effectLst/>
+                <a:latin typeface="system-ui"/>
+              </a:rPr>
+              <a:t>.</a:t>
+            </a:r>
+          </a:p>
+          <a:p>
+            <a:pPr marL="342900" indent="-342900">
+              <a:buFontTx/>
+              <a:buAutoNum type="arabicPeriod"/>
+            </a:pPr>
+            <a:r>
+              <a:rPr lang="en-US" b="0" i="0" dirty="0">
+                <a:effectLst/>
+                <a:latin typeface="system-ui"/>
+              </a:rPr>
+              <a:t>More than 47% of borrowers with Annual income between 31k and 85k and Interest rates between 21% &amp; 24% </a:t>
+            </a:r>
+            <a:r>
+              <a:rPr lang="en-US" b="1" i="0" dirty="0">
+                <a:effectLst/>
+                <a:latin typeface="system-ui"/>
+              </a:rPr>
+              <a:t>defaulted</a:t>
+            </a:r>
+            <a:r>
+              <a:rPr lang="en-US" b="0" i="0" dirty="0">
+                <a:effectLst/>
+                <a:latin typeface="system-ui"/>
+              </a:rPr>
+              <a:t>.</a:t>
+            </a:r>
+          </a:p>
+          <a:p>
+            <a:endParaRPr lang="en-US" b="0" i="0" dirty="0">
+              <a:effectLst/>
+              <a:latin typeface="system-ui"/>
+            </a:endParaRPr>
+          </a:p>
+        </p:txBody>
+      </p:sp>
+      <p:sp>
+        <p:nvSpPr>
+          <p:cNvPr id="9" name="Title 1">
+            <a:extLst>
+              <a:ext uri="{FF2B5EF4-FFF2-40B4-BE49-F238E27FC236}">
+                <a16:creationId xmlns:a16="http://schemas.microsoft.com/office/drawing/2014/main" id="{B12C4308-289C-71A2-56CE-A4F57BE2E636}"/>
+              </a:ext>
+            </a:extLst>
+          </p:cNvPr>
+          <p:cNvSpPr txBox="1">
+            <a:spLocks/>
+          </p:cNvSpPr>
+          <p:nvPr/>
+        </p:nvSpPr>
+        <p:spPr>
+          <a:xfrm>
+            <a:off x="222470" y="-168275"/>
+            <a:ext cx="11415596" cy="1325563"/>
+          </a:xfrm>
+          <a:prstGeom prst="rect">
+            <a:avLst/>
+          </a:prstGeom>
+        </p:spPr>
+        <p:txBody>
+          <a:bodyPr vert="horz" lIns="91440" tIns="45720" rIns="91440" bIns="45720" rtlCol="0" anchor="b">
+            <a:normAutofit/>
+          </a:bodyPr>
+          <a:lstStyle>
+            <a:lvl1pPr algn="ctr" defTabSz="914400" rtl="0" eaLnBrk="1" latinLnBrk="0" hangingPunct="1">
+              <a:lnSpc>
+                <a:spcPct val="90000"/>
+              </a:lnSpc>
+              <a:spcBef>
+                <a:spcPct val="0"/>
+              </a:spcBef>
+              <a:buNone/>
+              <a:defRPr sz="6000" kern="1200">
+                <a:solidFill>
+                  <a:schemeClr val="tx1"/>
+                </a:solidFill>
+                <a:latin typeface="+mj-lt"/>
+                <a:ea typeface="+mj-ea"/>
+                <a:cs typeface="+mj-cs"/>
+              </a:defRPr>
+            </a:lvl1pPr>
+          </a:lstStyle>
+          <a:p>
+            <a:r>
+              <a:rPr lang="en-US" sz="4000" b="1" dirty="0"/>
+              <a:t>Annual income category vs other quantitative variables</a:t>
+            </a:r>
+          </a:p>
+        </p:txBody>
+      </p:sp>
+      <p:pic>
+        <p:nvPicPr>
+          <p:cNvPr id="2" name="Picture 1">
+            <a:extLst>
+              <a:ext uri="{FF2B5EF4-FFF2-40B4-BE49-F238E27FC236}">
+                <a16:creationId xmlns:a16="http://schemas.microsoft.com/office/drawing/2014/main" id="{C1E8A98B-2187-2A8C-5099-B83847C4926C}"/>
+              </a:ext>
+            </a:extLst>
+          </p:cNvPr>
+          <p:cNvPicPr>
+            <a:picLocks noChangeAspect="1"/>
+          </p:cNvPicPr>
+          <p:nvPr/>
+        </p:nvPicPr>
+        <p:blipFill>
+          <a:blip r:embed="rId2"/>
+          <a:stretch>
+            <a:fillRect/>
+          </a:stretch>
+        </p:blipFill>
+        <p:spPr>
+          <a:xfrm>
+            <a:off x="549564" y="1386015"/>
+            <a:ext cx="5394036" cy="3710790"/>
+          </a:xfrm>
+          <a:prstGeom prst="rect">
+            <a:avLst/>
+          </a:prstGeom>
+        </p:spPr>
+      </p:pic>
+      <p:pic>
+        <p:nvPicPr>
+          <p:cNvPr id="3" name="Picture 2">
+            <a:extLst>
+              <a:ext uri="{FF2B5EF4-FFF2-40B4-BE49-F238E27FC236}">
+                <a16:creationId xmlns:a16="http://schemas.microsoft.com/office/drawing/2014/main" id="{FC141F97-D21E-BD4B-4CCE-FD32D9EFE110}"/>
+              </a:ext>
+            </a:extLst>
+          </p:cNvPr>
+          <p:cNvPicPr>
+            <a:picLocks noChangeAspect="1"/>
+          </p:cNvPicPr>
+          <p:nvPr/>
+        </p:nvPicPr>
+        <p:blipFill>
+          <a:blip r:embed="rId3"/>
+          <a:stretch>
+            <a:fillRect/>
+          </a:stretch>
+        </p:blipFill>
+        <p:spPr>
+          <a:xfrm>
+            <a:off x="5952838" y="1330666"/>
+            <a:ext cx="5578762" cy="3821488"/>
+          </a:xfrm>
+          <a:prstGeom prst="rect">
+            <a:avLst/>
+          </a:prstGeom>
+        </p:spPr>
+      </p:pic>
+    </p:spTree>
+    <p:extLst>
+      <p:ext uri="{BB962C8B-B14F-4D97-AF65-F5344CB8AC3E}">
+        <p14:creationId xmlns:p14="http://schemas.microsoft.com/office/powerpoint/2010/main" val="218154376"/>
       </p:ext>
     </p:extLst>
   </p:cSld>
@@ -3391,6 +3770,683 @@
           <a:chExt cx="0" cy="0"/>
         </a:xfrm>
       </p:grpSpPr>
+      <p:sp>
+        <p:nvSpPr>
+          <p:cNvPr id="2" name="Title 1">
+            <a:extLst>
+              <a:ext uri="{FF2B5EF4-FFF2-40B4-BE49-F238E27FC236}">
+                <a16:creationId xmlns:a16="http://schemas.microsoft.com/office/drawing/2014/main" id="{192B6BBD-345C-6950-E387-AABFA86580F2}"/>
+              </a:ext>
+            </a:extLst>
+          </p:cNvPr>
+          <p:cNvSpPr>
+            <a:spLocks noGrp="1"/>
+          </p:cNvSpPr>
+          <p:nvPr>
+            <p:ph type="title"/>
+          </p:nvPr>
+        </p:nvSpPr>
+        <p:spPr>
+          <a:xfrm>
+            <a:off x="838200" y="2766218"/>
+            <a:ext cx="10515600" cy="1325563"/>
+          </a:xfrm>
+        </p:spPr>
+        <p:txBody>
+          <a:bodyPr>
+            <a:normAutofit fontScale="90000"/>
+          </a:bodyPr>
+          <a:lstStyle/>
+          <a:p>
+            <a:pPr algn="ctr"/>
+            <a:r>
+              <a:rPr lang="en-US" sz="4800" b="1" dirty="0"/>
+              <a:t>Bivariate Analysis continuous variables using binning</a:t>
+            </a:r>
+          </a:p>
+        </p:txBody>
+      </p:sp>
+    </p:spTree>
+    <p:extLst>
+      <p:ext uri="{BB962C8B-B14F-4D97-AF65-F5344CB8AC3E}">
+        <p14:creationId xmlns:p14="http://schemas.microsoft.com/office/powerpoint/2010/main" val="2251903393"/>
+      </p:ext>
+    </p:extLst>
+  </p:cSld>
+  <p:clrMapOvr>
+    <a:masterClrMapping/>
+  </p:clrMapOvr>
+</p:sld>
+</file>
+
+<file path=ppt/slides/slide3.xml><?xml version="1.0" encoding="utf-8"?>
+<p:sld xmlns:a="http://schemas.openxmlformats.org/drawingml/2006/main" xmlns:r="http://schemas.openxmlformats.org/officeDocument/2006/relationships" xmlns:p="http://schemas.openxmlformats.org/presentationml/2006/main">
+  <p:cSld>
+    <p:spTree>
+      <p:nvGrpSpPr>
+        <p:cNvPr id="1" name=""/>
+        <p:cNvGrpSpPr/>
+        <p:nvPr/>
+      </p:nvGrpSpPr>
+      <p:grpSpPr>
+        <a:xfrm>
+          <a:off x="0" y="0"/>
+          <a:ext cx="0" cy="0"/>
+          <a:chOff x="0" y="0"/>
+          <a:chExt cx="0" cy="0"/>
+        </a:xfrm>
+      </p:grpSpPr>
+      <p:sp>
+        <p:nvSpPr>
+          <p:cNvPr id="8" name="TextBox 7">
+            <a:extLst>
+              <a:ext uri="{FF2B5EF4-FFF2-40B4-BE49-F238E27FC236}">
+                <a16:creationId xmlns:a16="http://schemas.microsoft.com/office/drawing/2014/main" id="{48249AEC-557F-5219-A9FE-C61D6E16E4F1}"/>
+              </a:ext>
+            </a:extLst>
+          </p:cNvPr>
+          <p:cNvSpPr txBox="1"/>
+          <p:nvPr/>
+        </p:nvSpPr>
+        <p:spPr>
+          <a:xfrm>
+            <a:off x="528534" y="5335873"/>
+            <a:ext cx="11739666" cy="1200329"/>
+          </a:xfrm>
+          <a:prstGeom prst="rect">
+            <a:avLst/>
+          </a:prstGeom>
+          <a:noFill/>
+        </p:spPr>
+        <p:txBody>
+          <a:bodyPr wrap="square" rtlCol="0">
+            <a:spAutoFit/>
+          </a:bodyPr>
+          <a:lstStyle/>
+          <a:p>
+            <a:pPr algn="l"/>
+            <a:r>
+              <a:rPr lang="en-US" b="1" i="0" dirty="0">
+                <a:effectLst/>
+                <a:latin typeface="system-ui"/>
+              </a:rPr>
+              <a:t>Conclusions drawn</a:t>
+            </a:r>
+          </a:p>
+          <a:p>
+            <a:pPr marL="342900" indent="-342900" algn="l">
+              <a:buAutoNum type="arabicPeriod"/>
+            </a:pPr>
+            <a:r>
+              <a:rPr lang="en-US" b="0" i="0" dirty="0">
+                <a:effectLst/>
+                <a:latin typeface="system-ui"/>
+              </a:rPr>
+              <a:t>More loans were disbursed to with loan amounts under 7k.</a:t>
+            </a:r>
+          </a:p>
+          <a:p>
+            <a:pPr marL="342900" indent="-342900" algn="l">
+              <a:buAutoNum type="arabicPeriod"/>
+            </a:pPr>
+            <a:r>
+              <a:rPr lang="en-US" b="0" i="0" dirty="0">
+                <a:effectLst/>
+                <a:latin typeface="system-ui"/>
+              </a:rPr>
+              <a:t>Trend is that % of defaulting increases as the loan amount increases, &gt;20% of loans with loan amount &gt;21k were </a:t>
+            </a:r>
+            <a:r>
+              <a:rPr lang="en-US" b="1" i="0" dirty="0">
+                <a:effectLst/>
+                <a:latin typeface="system-ui"/>
+              </a:rPr>
+              <a:t>defaulted</a:t>
+            </a:r>
+            <a:r>
+              <a:rPr lang="en-US" b="0" i="0" dirty="0">
+                <a:effectLst/>
+                <a:latin typeface="system-ui"/>
+              </a:rPr>
+              <a:t>.</a:t>
+            </a:r>
+          </a:p>
+        </p:txBody>
+      </p:sp>
+      <p:sp>
+        <p:nvSpPr>
+          <p:cNvPr id="9" name="Title 1">
+            <a:extLst>
+              <a:ext uri="{FF2B5EF4-FFF2-40B4-BE49-F238E27FC236}">
+                <a16:creationId xmlns:a16="http://schemas.microsoft.com/office/drawing/2014/main" id="{B12C4308-289C-71A2-56CE-A4F57BE2E636}"/>
+              </a:ext>
+            </a:extLst>
+          </p:cNvPr>
+          <p:cNvSpPr txBox="1">
+            <a:spLocks/>
+          </p:cNvSpPr>
+          <p:nvPr/>
+        </p:nvSpPr>
+        <p:spPr>
+          <a:xfrm>
+            <a:off x="222470" y="-168275"/>
+            <a:ext cx="11415596" cy="1325563"/>
+          </a:xfrm>
+          <a:prstGeom prst="rect">
+            <a:avLst/>
+          </a:prstGeom>
+        </p:spPr>
+        <p:txBody>
+          <a:bodyPr vert="horz" lIns="91440" tIns="45720" rIns="91440" bIns="45720" rtlCol="0" anchor="b">
+            <a:normAutofit/>
+          </a:bodyPr>
+          <a:lstStyle>
+            <a:lvl1pPr algn="ctr" defTabSz="914400" rtl="0" eaLnBrk="1" latinLnBrk="0" hangingPunct="1">
+              <a:lnSpc>
+                <a:spcPct val="90000"/>
+              </a:lnSpc>
+              <a:spcBef>
+                <a:spcPct val="0"/>
+              </a:spcBef>
+              <a:buNone/>
+              <a:defRPr sz="6000" kern="1200">
+                <a:solidFill>
+                  <a:schemeClr val="tx1"/>
+                </a:solidFill>
+                <a:latin typeface="+mj-lt"/>
+                <a:ea typeface="+mj-ea"/>
+                <a:cs typeface="+mj-cs"/>
+              </a:defRPr>
+            </a:lvl1pPr>
+          </a:lstStyle>
+          <a:p>
+            <a:r>
+              <a:rPr lang="en-US" sz="4000" b="1" dirty="0"/>
+              <a:t>Analysis of Loan amount groups</a:t>
+            </a:r>
+          </a:p>
+        </p:txBody>
+      </p:sp>
+      <p:pic>
+        <p:nvPicPr>
+          <p:cNvPr id="4" name="Picture 3">
+            <a:extLst>
+              <a:ext uri="{FF2B5EF4-FFF2-40B4-BE49-F238E27FC236}">
+                <a16:creationId xmlns:a16="http://schemas.microsoft.com/office/drawing/2014/main" id="{F512B41E-6A97-8D28-3205-2807E0F0FA62}"/>
+              </a:ext>
+            </a:extLst>
+          </p:cNvPr>
+          <p:cNvPicPr>
+            <a:picLocks noChangeAspect="1"/>
+          </p:cNvPicPr>
+          <p:nvPr/>
+        </p:nvPicPr>
+        <p:blipFill>
+          <a:blip r:embed="rId2"/>
+          <a:stretch>
+            <a:fillRect/>
+          </a:stretch>
+        </p:blipFill>
+        <p:spPr>
+          <a:xfrm>
+            <a:off x="76200" y="804248"/>
+            <a:ext cx="12192000" cy="4301238"/>
+          </a:xfrm>
+          <a:prstGeom prst="rect">
+            <a:avLst/>
+          </a:prstGeom>
+        </p:spPr>
+      </p:pic>
+    </p:spTree>
+    <p:extLst>
+      <p:ext uri="{BB962C8B-B14F-4D97-AF65-F5344CB8AC3E}">
+        <p14:creationId xmlns:p14="http://schemas.microsoft.com/office/powerpoint/2010/main" val="3679841492"/>
+      </p:ext>
+    </p:extLst>
+  </p:cSld>
+  <p:clrMapOvr>
+    <a:masterClrMapping/>
+  </p:clrMapOvr>
+</p:sld>
+</file>
+
+<file path=ppt/slides/slide4.xml><?xml version="1.0" encoding="utf-8"?>
+<p:sld xmlns:a="http://schemas.openxmlformats.org/drawingml/2006/main" xmlns:r="http://schemas.openxmlformats.org/officeDocument/2006/relationships" xmlns:p="http://schemas.openxmlformats.org/presentationml/2006/main">
+  <p:cSld>
+    <p:spTree>
+      <p:nvGrpSpPr>
+        <p:cNvPr id="1" name=""/>
+        <p:cNvGrpSpPr/>
+        <p:nvPr/>
+      </p:nvGrpSpPr>
+      <p:grpSpPr>
+        <a:xfrm>
+          <a:off x="0" y="0"/>
+          <a:ext cx="0" cy="0"/>
+          <a:chOff x="0" y="0"/>
+          <a:chExt cx="0" cy="0"/>
+        </a:xfrm>
+      </p:grpSpPr>
+      <p:sp>
+        <p:nvSpPr>
+          <p:cNvPr id="8" name="TextBox 7">
+            <a:extLst>
+              <a:ext uri="{FF2B5EF4-FFF2-40B4-BE49-F238E27FC236}">
+                <a16:creationId xmlns:a16="http://schemas.microsoft.com/office/drawing/2014/main" id="{48249AEC-557F-5219-A9FE-C61D6E16E4F1}"/>
+              </a:ext>
+            </a:extLst>
+          </p:cNvPr>
+          <p:cNvSpPr txBox="1"/>
+          <p:nvPr/>
+        </p:nvSpPr>
+        <p:spPr>
+          <a:xfrm>
+            <a:off x="528534" y="5335873"/>
+            <a:ext cx="11739666" cy="923330"/>
+          </a:xfrm>
+          <a:prstGeom prst="rect">
+            <a:avLst/>
+          </a:prstGeom>
+          <a:noFill/>
+        </p:spPr>
+        <p:txBody>
+          <a:bodyPr wrap="square" rtlCol="0">
+            <a:spAutoFit/>
+          </a:bodyPr>
+          <a:lstStyle/>
+          <a:p>
+            <a:pPr algn="l"/>
+            <a:r>
+              <a:rPr lang="en-US" b="1" i="0" dirty="0">
+                <a:effectLst/>
+                <a:latin typeface="system-ui"/>
+              </a:rPr>
+              <a:t>Conclusions drawn</a:t>
+            </a:r>
+          </a:p>
+          <a:p>
+            <a:pPr marL="342900" indent="-342900" algn="l">
+              <a:buAutoNum type="arabicPeriod"/>
+            </a:pPr>
+            <a:r>
+              <a:rPr lang="en-US" b="0" i="0" dirty="0">
+                <a:effectLst/>
+                <a:latin typeface="system-ui"/>
+              </a:rPr>
+              <a:t>Number of loans taken and defaulted kept on increasing from Jan to Dec and peaked in Dec.</a:t>
+            </a:r>
+          </a:p>
+          <a:p>
+            <a:pPr marL="342900" indent="-342900" algn="l">
+              <a:buAutoNum type="arabicPeriod"/>
+            </a:pPr>
+            <a:r>
+              <a:rPr lang="en-US" b="0" i="0" dirty="0">
+                <a:effectLst/>
+                <a:latin typeface="system-ui"/>
+              </a:rPr>
+              <a:t>Percentage of loans defaulted were highest when issued in May, Sep and Dec.</a:t>
+            </a:r>
+          </a:p>
+        </p:txBody>
+      </p:sp>
+      <p:sp>
+        <p:nvSpPr>
+          <p:cNvPr id="9" name="Title 1">
+            <a:extLst>
+              <a:ext uri="{FF2B5EF4-FFF2-40B4-BE49-F238E27FC236}">
+                <a16:creationId xmlns:a16="http://schemas.microsoft.com/office/drawing/2014/main" id="{B12C4308-289C-71A2-56CE-A4F57BE2E636}"/>
+              </a:ext>
+            </a:extLst>
+          </p:cNvPr>
+          <p:cNvSpPr txBox="1">
+            <a:spLocks/>
+          </p:cNvSpPr>
+          <p:nvPr/>
+        </p:nvSpPr>
+        <p:spPr>
+          <a:xfrm>
+            <a:off x="222470" y="-168275"/>
+            <a:ext cx="11415596" cy="1325563"/>
+          </a:xfrm>
+          <a:prstGeom prst="rect">
+            <a:avLst/>
+          </a:prstGeom>
+        </p:spPr>
+        <p:txBody>
+          <a:bodyPr vert="horz" lIns="91440" tIns="45720" rIns="91440" bIns="45720" rtlCol="0" anchor="b">
+            <a:normAutofit/>
+          </a:bodyPr>
+          <a:lstStyle>
+            <a:lvl1pPr algn="ctr" defTabSz="914400" rtl="0" eaLnBrk="1" latinLnBrk="0" hangingPunct="1">
+              <a:lnSpc>
+                <a:spcPct val="90000"/>
+              </a:lnSpc>
+              <a:spcBef>
+                <a:spcPct val="0"/>
+              </a:spcBef>
+              <a:buNone/>
+              <a:defRPr sz="6000" kern="1200">
+                <a:solidFill>
+                  <a:schemeClr val="tx1"/>
+                </a:solidFill>
+                <a:latin typeface="+mj-lt"/>
+                <a:ea typeface="+mj-ea"/>
+                <a:cs typeface="+mj-cs"/>
+              </a:defRPr>
+            </a:lvl1pPr>
+          </a:lstStyle>
+          <a:p>
+            <a:r>
+              <a:rPr lang="en-US" sz="4000" b="1" dirty="0"/>
+              <a:t>Analysis of Loan issue month</a:t>
+            </a:r>
+          </a:p>
+        </p:txBody>
+      </p:sp>
+      <p:pic>
+        <p:nvPicPr>
+          <p:cNvPr id="3" name="Picture 2">
+            <a:extLst>
+              <a:ext uri="{FF2B5EF4-FFF2-40B4-BE49-F238E27FC236}">
+                <a16:creationId xmlns:a16="http://schemas.microsoft.com/office/drawing/2014/main" id="{D0878B0C-ED89-9270-7DE2-4F2B037AAEAF}"/>
+              </a:ext>
+            </a:extLst>
+          </p:cNvPr>
+          <p:cNvPicPr>
+            <a:picLocks noChangeAspect="1"/>
+          </p:cNvPicPr>
+          <p:nvPr/>
+        </p:nvPicPr>
+        <p:blipFill>
+          <a:blip r:embed="rId2"/>
+          <a:stretch>
+            <a:fillRect/>
+          </a:stretch>
+        </p:blipFill>
+        <p:spPr>
+          <a:xfrm>
+            <a:off x="0" y="1626831"/>
+            <a:ext cx="12192000" cy="3239498"/>
+          </a:xfrm>
+          <a:prstGeom prst="rect">
+            <a:avLst/>
+          </a:prstGeom>
+        </p:spPr>
+      </p:pic>
+    </p:spTree>
+    <p:extLst>
+      <p:ext uri="{BB962C8B-B14F-4D97-AF65-F5344CB8AC3E}">
+        <p14:creationId xmlns:p14="http://schemas.microsoft.com/office/powerpoint/2010/main" val="3774288545"/>
+      </p:ext>
+    </p:extLst>
+  </p:cSld>
+  <p:clrMapOvr>
+    <a:masterClrMapping/>
+  </p:clrMapOvr>
+</p:sld>
+</file>
+
+<file path=ppt/slides/slide5.xml><?xml version="1.0" encoding="utf-8"?>
+<p:sld xmlns:a="http://schemas.openxmlformats.org/drawingml/2006/main" xmlns:r="http://schemas.openxmlformats.org/officeDocument/2006/relationships" xmlns:p="http://schemas.openxmlformats.org/presentationml/2006/main">
+  <p:cSld>
+    <p:spTree>
+      <p:nvGrpSpPr>
+        <p:cNvPr id="1" name=""/>
+        <p:cNvGrpSpPr/>
+        <p:nvPr/>
+      </p:nvGrpSpPr>
+      <p:grpSpPr>
+        <a:xfrm>
+          <a:off x="0" y="0"/>
+          <a:ext cx="0" cy="0"/>
+          <a:chOff x="0" y="0"/>
+          <a:chExt cx="0" cy="0"/>
+        </a:xfrm>
+      </p:grpSpPr>
+      <p:sp>
+        <p:nvSpPr>
+          <p:cNvPr id="8" name="TextBox 7">
+            <a:extLst>
+              <a:ext uri="{FF2B5EF4-FFF2-40B4-BE49-F238E27FC236}">
+                <a16:creationId xmlns:a16="http://schemas.microsoft.com/office/drawing/2014/main" id="{48249AEC-557F-5219-A9FE-C61D6E16E4F1}"/>
+              </a:ext>
+            </a:extLst>
+          </p:cNvPr>
+          <p:cNvSpPr txBox="1"/>
+          <p:nvPr/>
+        </p:nvSpPr>
+        <p:spPr>
+          <a:xfrm>
+            <a:off x="299934" y="5360870"/>
+            <a:ext cx="11739666" cy="1200329"/>
+          </a:xfrm>
+          <a:prstGeom prst="rect">
+            <a:avLst/>
+          </a:prstGeom>
+          <a:noFill/>
+        </p:spPr>
+        <p:txBody>
+          <a:bodyPr wrap="square" rtlCol="0">
+            <a:spAutoFit/>
+          </a:bodyPr>
+          <a:lstStyle/>
+          <a:p>
+            <a:pPr algn="l"/>
+            <a:r>
+              <a:rPr lang="en-US" b="1" i="0" dirty="0">
+                <a:effectLst/>
+                <a:latin typeface="system-ui"/>
+              </a:rPr>
+              <a:t>Conclusions drawn</a:t>
+            </a:r>
+          </a:p>
+          <a:p>
+            <a:pPr marL="342900" indent="-342900" algn="l">
+              <a:buAutoNum type="arabicPeriod"/>
+            </a:pPr>
+            <a:r>
+              <a:rPr lang="en-US" b="0" i="0" dirty="0">
+                <a:effectLst/>
+                <a:latin typeface="system-ui"/>
+              </a:rPr>
+              <a:t>Loan borrowers with high credit line utilization (&gt;40%) are defaulting loans more.</a:t>
+            </a:r>
+          </a:p>
+          <a:p>
+            <a:pPr marL="342900" indent="-342900" algn="l">
+              <a:buAutoNum type="arabicPeriod"/>
+            </a:pPr>
+            <a:r>
+              <a:rPr lang="en-US" b="0" i="0" dirty="0">
+                <a:effectLst/>
+                <a:latin typeface="system-ui"/>
+              </a:rPr>
+              <a:t>We can clearly see the trend that charged-off loan percentage is increasing as the credit revolving line utilization percent is increasing.</a:t>
+            </a:r>
+          </a:p>
+        </p:txBody>
+      </p:sp>
+      <p:sp>
+        <p:nvSpPr>
+          <p:cNvPr id="9" name="Title 1">
+            <a:extLst>
+              <a:ext uri="{FF2B5EF4-FFF2-40B4-BE49-F238E27FC236}">
+                <a16:creationId xmlns:a16="http://schemas.microsoft.com/office/drawing/2014/main" id="{B12C4308-289C-71A2-56CE-A4F57BE2E636}"/>
+              </a:ext>
+            </a:extLst>
+          </p:cNvPr>
+          <p:cNvSpPr txBox="1">
+            <a:spLocks/>
+          </p:cNvSpPr>
+          <p:nvPr/>
+        </p:nvSpPr>
+        <p:spPr>
+          <a:xfrm>
+            <a:off x="222470" y="-168275"/>
+            <a:ext cx="11415596" cy="1325563"/>
+          </a:xfrm>
+          <a:prstGeom prst="rect">
+            <a:avLst/>
+          </a:prstGeom>
+        </p:spPr>
+        <p:txBody>
+          <a:bodyPr vert="horz" lIns="91440" tIns="45720" rIns="91440" bIns="45720" rtlCol="0" anchor="b">
+            <a:normAutofit/>
+          </a:bodyPr>
+          <a:lstStyle>
+            <a:lvl1pPr algn="ctr" defTabSz="914400" rtl="0" eaLnBrk="1" latinLnBrk="0" hangingPunct="1">
+              <a:lnSpc>
+                <a:spcPct val="90000"/>
+              </a:lnSpc>
+              <a:spcBef>
+                <a:spcPct val="0"/>
+              </a:spcBef>
+              <a:buNone/>
+              <a:defRPr sz="6000" kern="1200">
+                <a:solidFill>
+                  <a:schemeClr val="tx1"/>
+                </a:solidFill>
+                <a:latin typeface="+mj-lt"/>
+                <a:ea typeface="+mj-ea"/>
+                <a:cs typeface="+mj-cs"/>
+              </a:defRPr>
+            </a:lvl1pPr>
+          </a:lstStyle>
+          <a:p>
+            <a:r>
+              <a:rPr lang="en-US" sz="4000" b="1" dirty="0"/>
+              <a:t>Analysis of Revolving utilization groups</a:t>
+            </a:r>
+          </a:p>
+        </p:txBody>
+      </p:sp>
+      <p:pic>
+        <p:nvPicPr>
+          <p:cNvPr id="4" name="Picture 3">
+            <a:extLst>
+              <a:ext uri="{FF2B5EF4-FFF2-40B4-BE49-F238E27FC236}">
+                <a16:creationId xmlns:a16="http://schemas.microsoft.com/office/drawing/2014/main" id="{34CF1E3C-EB96-EE07-2AFF-78877DCBE128}"/>
+              </a:ext>
+            </a:extLst>
+          </p:cNvPr>
+          <p:cNvPicPr>
+            <a:picLocks noChangeAspect="1"/>
+          </p:cNvPicPr>
+          <p:nvPr/>
+        </p:nvPicPr>
+        <p:blipFill>
+          <a:blip r:embed="rId2"/>
+          <a:stretch>
+            <a:fillRect/>
+          </a:stretch>
+        </p:blipFill>
+        <p:spPr>
+          <a:xfrm>
+            <a:off x="0" y="1497130"/>
+            <a:ext cx="12192000" cy="3355740"/>
+          </a:xfrm>
+          <a:prstGeom prst="rect">
+            <a:avLst/>
+          </a:prstGeom>
+        </p:spPr>
+      </p:pic>
+    </p:spTree>
+    <p:extLst>
+      <p:ext uri="{BB962C8B-B14F-4D97-AF65-F5344CB8AC3E}">
+        <p14:creationId xmlns:p14="http://schemas.microsoft.com/office/powerpoint/2010/main" val="196218171"/>
+      </p:ext>
+    </p:extLst>
+  </p:cSld>
+  <p:clrMapOvr>
+    <a:masterClrMapping/>
+  </p:clrMapOvr>
+</p:sld>
+</file>
+
+<file path=ppt/slides/slide6.xml><?xml version="1.0" encoding="utf-8"?>
+<p:sld xmlns:a="http://schemas.openxmlformats.org/drawingml/2006/main" xmlns:r="http://schemas.openxmlformats.org/officeDocument/2006/relationships" xmlns:p="http://schemas.openxmlformats.org/presentationml/2006/main">
+  <p:cSld>
+    <p:spTree>
+      <p:nvGrpSpPr>
+        <p:cNvPr id="1" name=""/>
+        <p:cNvGrpSpPr/>
+        <p:nvPr/>
+      </p:nvGrpSpPr>
+      <p:grpSpPr>
+        <a:xfrm>
+          <a:off x="0" y="0"/>
+          <a:ext cx="0" cy="0"/>
+          <a:chOff x="0" y="0"/>
+          <a:chExt cx="0" cy="0"/>
+        </a:xfrm>
+      </p:grpSpPr>
+      <p:sp>
+        <p:nvSpPr>
+          <p:cNvPr id="2" name="Title 1">
+            <a:extLst>
+              <a:ext uri="{FF2B5EF4-FFF2-40B4-BE49-F238E27FC236}">
+                <a16:creationId xmlns:a16="http://schemas.microsoft.com/office/drawing/2014/main" id="{192B6BBD-345C-6950-E387-AABFA86580F2}"/>
+              </a:ext>
+            </a:extLst>
+          </p:cNvPr>
+          <p:cNvSpPr>
+            <a:spLocks noGrp="1"/>
+          </p:cNvSpPr>
+          <p:nvPr>
+            <p:ph type="title"/>
+          </p:nvPr>
+        </p:nvSpPr>
+        <p:spPr>
+          <a:xfrm>
+            <a:off x="838200" y="2766218"/>
+            <a:ext cx="10515600" cy="1325563"/>
+          </a:xfrm>
+        </p:spPr>
+        <p:txBody>
+          <a:bodyPr>
+            <a:normAutofit/>
+          </a:bodyPr>
+          <a:lstStyle/>
+          <a:p>
+            <a:pPr algn="ctr"/>
+            <a:r>
+              <a:rPr lang="en-US" sz="4800" b="1" dirty="0"/>
+              <a:t>Bivariate Analysis using Heatmaps</a:t>
+            </a:r>
+          </a:p>
+        </p:txBody>
+      </p:sp>
+    </p:spTree>
+    <p:extLst>
+      <p:ext uri="{BB962C8B-B14F-4D97-AF65-F5344CB8AC3E}">
+        <p14:creationId xmlns:p14="http://schemas.microsoft.com/office/powerpoint/2010/main" val="2285812875"/>
+      </p:ext>
+    </p:extLst>
+  </p:cSld>
+  <p:clrMapOvr>
+    <a:masterClrMapping/>
+  </p:clrMapOvr>
+</p:sld>
+</file>
+
+<file path=ppt/slides/slide7.xml><?xml version="1.0" encoding="utf-8"?>
+<p:sld xmlns:a="http://schemas.openxmlformats.org/drawingml/2006/main" xmlns:r="http://schemas.openxmlformats.org/officeDocument/2006/relationships" xmlns:p="http://schemas.openxmlformats.org/presentationml/2006/main">
+  <p:cSld>
+    <p:spTree>
+      <p:nvGrpSpPr>
+        <p:cNvPr id="1" name=""/>
+        <p:cNvGrpSpPr/>
+        <p:nvPr/>
+      </p:nvGrpSpPr>
+      <p:grpSpPr>
+        <a:xfrm>
+          <a:off x="0" y="0"/>
+          <a:ext cx="0" cy="0"/>
+          <a:chOff x="0" y="0"/>
+          <a:chExt cx="0" cy="0"/>
+        </a:xfrm>
+      </p:grpSpPr>
       <p:pic>
         <p:nvPicPr>
           <p:cNvPr id="5" name="Picture 4">
@@ -3620,7 +4676,7 @@
 </p:sld>
 </file>
 
-<file path=ppt/slides/slide3.xml><?xml version="1.0" encoding="utf-8"?>
+<file path=ppt/slides/slide8.xml><?xml version="1.0" encoding="utf-8"?>
 <p:sld xmlns:a="http://schemas.openxmlformats.org/drawingml/2006/main" xmlns:r="http://schemas.openxmlformats.org/officeDocument/2006/relationships" xmlns:p="http://schemas.openxmlformats.org/presentationml/2006/main">
   <p:cSld>
     <p:spTree>
@@ -3866,7 +4922,7 @@
 </p:sld>
 </file>
 
-<file path=ppt/slides/slide4.xml><?xml version="1.0" encoding="utf-8"?>
+<file path=ppt/slides/slide9.xml><?xml version="1.0" encoding="utf-8"?>
 <p:sld xmlns:a="http://schemas.openxmlformats.org/drawingml/2006/main" xmlns:r="http://schemas.openxmlformats.org/officeDocument/2006/relationships" xmlns:p="http://schemas.openxmlformats.org/presentationml/2006/main">
   <p:cSld>
     <p:spTree>
@@ -4103,252 +5159,6 @@
     <p:extLst>
       <p:ext uri="{BB962C8B-B14F-4D97-AF65-F5344CB8AC3E}">
         <p14:creationId xmlns:p14="http://schemas.microsoft.com/office/powerpoint/2010/main" val="3983882771"/>
-      </p:ext>
-    </p:extLst>
-  </p:cSld>
-  <p:clrMapOvr>
-    <a:masterClrMapping/>
-  </p:clrMapOvr>
-</p:sld>
-</file>
-
-<file path=ppt/slides/slide5.xml><?xml version="1.0" encoding="utf-8"?>
-<p:sld xmlns:a="http://schemas.openxmlformats.org/drawingml/2006/main" xmlns:r="http://schemas.openxmlformats.org/officeDocument/2006/relationships" xmlns:p="http://schemas.openxmlformats.org/presentationml/2006/main">
-  <p:cSld>
-    <p:spTree>
-      <p:nvGrpSpPr>
-        <p:cNvPr id="1" name=""/>
-        <p:cNvGrpSpPr/>
-        <p:nvPr/>
-      </p:nvGrpSpPr>
-      <p:grpSpPr>
-        <a:xfrm>
-          <a:off x="0" y="0"/>
-          <a:ext cx="0" cy="0"/>
-          <a:chOff x="0" y="0"/>
-          <a:chExt cx="0" cy="0"/>
-        </a:xfrm>
-      </p:grpSpPr>
-      <p:sp>
-        <p:nvSpPr>
-          <p:cNvPr id="8" name="TextBox 7">
-            <a:extLst>
-              <a:ext uri="{FF2B5EF4-FFF2-40B4-BE49-F238E27FC236}">
-                <a16:creationId xmlns:a16="http://schemas.microsoft.com/office/drawing/2014/main" id="{48249AEC-557F-5219-A9FE-C61D6E16E4F1}"/>
-              </a:ext>
-            </a:extLst>
-          </p:cNvPr>
-          <p:cNvSpPr txBox="1"/>
-          <p:nvPr/>
-        </p:nvSpPr>
-        <p:spPr>
-          <a:xfrm>
-            <a:off x="452334" y="5325533"/>
-            <a:ext cx="11739666" cy="1754326"/>
-          </a:xfrm>
-          <a:prstGeom prst="rect">
-            <a:avLst/>
-          </a:prstGeom>
-          <a:noFill/>
-        </p:spPr>
-        <p:txBody>
-          <a:bodyPr wrap="square" rtlCol="0">
-            <a:spAutoFit/>
-          </a:bodyPr>
-          <a:lstStyle/>
-          <a:p>
-            <a:pPr algn="l"/>
-            <a:r>
-              <a:rPr lang="en-US" b="1" i="0" dirty="0">
-                <a:effectLst/>
-                <a:latin typeface="system-ui"/>
-              </a:rPr>
-              <a:t>Conclusions drawn</a:t>
-            </a:r>
-            <a:endParaRPr lang="en-US" b="0" i="0" dirty="0">
-              <a:effectLst/>
-              <a:latin typeface="system-ui"/>
-            </a:endParaRPr>
-          </a:p>
-          <a:p>
-            <a:pPr marL="342900" indent="-342900">
-              <a:buAutoNum type="arabicPeriod"/>
-            </a:pPr>
-            <a:r>
-              <a:rPr lang="en-US" b="0" i="0" dirty="0">
-                <a:effectLst/>
-                <a:latin typeface="system-ui"/>
-              </a:rPr>
-              <a:t>More than 50% of borrowers with Annual income between 58k and 85k and Active credit lines between 36 &amp; 44 </a:t>
-            </a:r>
-            <a:r>
-              <a:rPr lang="en-US" b="1" i="0" dirty="0">
-                <a:effectLst/>
-                <a:latin typeface="system-ui"/>
-              </a:rPr>
-              <a:t>defaulted</a:t>
-            </a:r>
-            <a:r>
-              <a:rPr lang="en-US" b="0" i="0" dirty="0">
-                <a:effectLst/>
-                <a:latin typeface="system-ui"/>
-              </a:rPr>
-              <a:t>.</a:t>
-            </a:r>
-          </a:p>
-          <a:p>
-            <a:pPr marL="342900" indent="-342900">
-              <a:buFontTx/>
-              <a:buAutoNum type="arabicPeriod"/>
-            </a:pPr>
-            <a:r>
-              <a:rPr lang="en-US" b="0" i="0" dirty="0">
-                <a:effectLst/>
-                <a:latin typeface="system-ui"/>
-              </a:rPr>
-              <a:t>More than 47% of borrowers with Annual income between 31k and 85k and Interest rates between 21% &amp; 24% </a:t>
-            </a:r>
-            <a:r>
-              <a:rPr lang="en-US" b="1" i="0" dirty="0">
-                <a:effectLst/>
-                <a:latin typeface="system-ui"/>
-              </a:rPr>
-              <a:t>defaulted</a:t>
-            </a:r>
-            <a:r>
-              <a:rPr lang="en-US" b="0" i="0" dirty="0">
-                <a:effectLst/>
-                <a:latin typeface="system-ui"/>
-              </a:rPr>
-              <a:t>.</a:t>
-            </a:r>
-          </a:p>
-          <a:p>
-            <a:endParaRPr lang="en-US" b="0" i="0" dirty="0">
-              <a:effectLst/>
-              <a:latin typeface="system-ui"/>
-            </a:endParaRPr>
-          </a:p>
-        </p:txBody>
-      </p:sp>
-      <p:sp>
-        <p:nvSpPr>
-          <p:cNvPr id="9" name="Title 1">
-            <a:extLst>
-              <a:ext uri="{FF2B5EF4-FFF2-40B4-BE49-F238E27FC236}">
-                <a16:creationId xmlns:a16="http://schemas.microsoft.com/office/drawing/2014/main" id="{B12C4308-289C-71A2-56CE-A4F57BE2E636}"/>
-              </a:ext>
-            </a:extLst>
-          </p:cNvPr>
-          <p:cNvSpPr txBox="1">
-            <a:spLocks/>
-          </p:cNvSpPr>
-          <p:nvPr/>
-        </p:nvSpPr>
-        <p:spPr>
-          <a:xfrm>
-            <a:off x="222470" y="-168275"/>
-            <a:ext cx="11415596" cy="1325563"/>
-          </a:xfrm>
-          <a:prstGeom prst="rect">
-            <a:avLst/>
-          </a:prstGeom>
-        </p:spPr>
-        <p:txBody>
-          <a:bodyPr vert="horz" lIns="91440" tIns="45720" rIns="91440" bIns="45720" rtlCol="0" anchor="b">
-            <a:normAutofit/>
-          </a:bodyPr>
-          <a:lstStyle>
-            <a:lvl1pPr algn="ctr" defTabSz="914400" rtl="0" eaLnBrk="1" latinLnBrk="0" hangingPunct="1">
-              <a:lnSpc>
-                <a:spcPct val="90000"/>
-              </a:lnSpc>
-              <a:spcBef>
-                <a:spcPct val="0"/>
-              </a:spcBef>
-              <a:buNone/>
-              <a:defRPr sz="6000" kern="1200">
-                <a:solidFill>
-                  <a:schemeClr val="tx1"/>
-                </a:solidFill>
-                <a:latin typeface="+mj-lt"/>
-                <a:ea typeface="+mj-ea"/>
-                <a:cs typeface="+mj-cs"/>
-              </a:defRPr>
-            </a:lvl1pPr>
-          </a:lstStyle>
-          <a:p>
-            <a:r>
-              <a:rPr lang="en-US" sz="4000" b="1" dirty="0"/>
-              <a:t>Annual income category vs other quantitative variables</a:t>
-            </a:r>
-          </a:p>
-        </p:txBody>
-      </p:sp>
-      <p:pic>
-        <p:nvPicPr>
-          <p:cNvPr id="2" name="Picture 1">
-            <a:extLst>
-              <a:ext uri="{FF2B5EF4-FFF2-40B4-BE49-F238E27FC236}">
-                <a16:creationId xmlns:a16="http://schemas.microsoft.com/office/drawing/2014/main" id="{C1E8A98B-2187-2A8C-5099-B83847C4926C}"/>
-              </a:ext>
-            </a:extLst>
-          </p:cNvPr>
-          <p:cNvPicPr>
-            <a:picLocks noChangeAspect="1"/>
-          </p:cNvPicPr>
-          <p:nvPr/>
-        </p:nvPicPr>
-        <p:blipFill>
-          <a:blip r:embed="rId2"/>
-          <a:stretch>
-            <a:fillRect/>
-          </a:stretch>
-        </p:blipFill>
-        <p:spPr>
-          <a:xfrm>
-            <a:off x="549564" y="1386015"/>
-            <a:ext cx="5394036" cy="3710790"/>
-          </a:xfrm>
-          <a:prstGeom prst="rect">
-            <a:avLst/>
-          </a:prstGeom>
-        </p:spPr>
-      </p:pic>
-      <p:pic>
-        <p:nvPicPr>
-          <p:cNvPr id="3" name="Picture 2">
-            <a:extLst>
-              <a:ext uri="{FF2B5EF4-FFF2-40B4-BE49-F238E27FC236}">
-                <a16:creationId xmlns:a16="http://schemas.microsoft.com/office/drawing/2014/main" id="{FC141F97-D21E-BD4B-4CCE-FD32D9EFE110}"/>
-              </a:ext>
-            </a:extLst>
-          </p:cNvPr>
-          <p:cNvPicPr>
-            <a:picLocks noChangeAspect="1"/>
-          </p:cNvPicPr>
-          <p:nvPr/>
-        </p:nvPicPr>
-        <p:blipFill>
-          <a:blip r:embed="rId3"/>
-          <a:stretch>
-            <a:fillRect/>
-          </a:stretch>
-        </p:blipFill>
-        <p:spPr>
-          <a:xfrm>
-            <a:off x="5952838" y="1330666"/>
-            <a:ext cx="5578762" cy="3821488"/>
-          </a:xfrm>
-          <a:prstGeom prst="rect">
-            <a:avLst/>
-          </a:prstGeom>
-        </p:spPr>
-      </p:pic>
-    </p:spTree>
-    <p:extLst>
-      <p:ext uri="{BB962C8B-B14F-4D97-AF65-F5344CB8AC3E}">
-        <p14:creationId xmlns:p14="http://schemas.microsoft.com/office/powerpoint/2010/main" val="218154376"/>
       </p:ext>
     </p:extLst>
   </p:cSld>

</xml_diff>